<commit_message>
Ažuriranje prezentacije i radnih sati.
Lektura prezentacije za predaju i dodavanje radnih sati u skladu s voditeljevim naputcima.
</commit_message>
<xml_diff>
--- a/Dokumentacija/PrezentacijaProjekata.pptx
+++ b/Dokumentacija/PrezentacijaProjekata.pptx
@@ -5,7 +5,7 @@
     <p:sldMasterId id="2147483687" r:id="rId1"/>
   </p:sldMasterIdLst>
   <p:notesMasterIdLst>
-    <p:notesMasterId r:id="rId18"/>
+    <p:notesMasterId r:id="rId17"/>
   </p:notesMasterIdLst>
   <p:sldIdLst>
     <p:sldId id="256" r:id="rId2"/>
@@ -22,8 +22,7 @@
     <p:sldId id="272" r:id="rId13"/>
     <p:sldId id="260" r:id="rId14"/>
     <p:sldId id="262" r:id="rId15"/>
-    <p:sldId id="273" r:id="rId16"/>
-    <p:sldId id="263" r:id="rId17"/>
+    <p:sldId id="263" r:id="rId16"/>
   </p:sldIdLst>
   <p:sldSz cx="9144000" cy="6858000" type="screen4x3"/>
   <p:notesSz cx="6858000" cy="9144000"/>
@@ -4759,11 +4758,7 @@
             </a:pPr>
             <a:r>
               <a:rPr lang="hr-HR" sz="2400" dirty="0"/>
-              <a:t>Ispitivanje aplikacije se izvodi pomoću </a:t>
-            </a:r>
-            <a:r>
-              <a:rPr lang="hr-HR" sz="2400" dirty="0" err="1"/>
-              <a:t>Jesta</a:t>
+              <a:t>Ispitivanje aplikacije se izvodi pomoću alata Jest</a:t>
             </a:r>
             <a:endParaRPr lang="en-US" sz="2400" dirty="0"/>
           </a:p>
@@ -4775,15 +4770,7 @@
             </a:pPr>
             <a:r>
               <a:rPr lang="hr-HR" sz="2400" dirty="0"/>
-              <a:t>Ispitujemo dostupnost ruta, npr. može li </a:t>
-            </a:r>
-            <a:r>
-              <a:rPr lang="hr-HR" sz="2400" dirty="0" err="1"/>
-              <a:t>normani</a:t>
-            </a:r>
-            <a:r>
-              <a:rPr lang="hr-HR" sz="2400" dirty="0"/>
-              <a:t> korisnik ili napraviti neku ilegalnu akciju na nekoj ruti</a:t>
+              <a:t>Ispitujemo dostupnost ruta, npr. može li uobičajeni korisnik pristupiti njemu namijenjenim stranicama ili pak napraviti ilegalnu akciju na nekoj ruti</a:t>
             </a:r>
           </a:p>
           <a:p>
@@ -4794,7 +4781,7 @@
             </a:pPr>
             <a:r>
               <a:rPr lang="hr-HR" sz="2400" dirty="0"/>
-              <a:t>Ispitujemo funkcije baze podataka te vraćaju li one točan rezultat</a:t>
+              <a:t>Ispitujemo funkcije baze podataka te vraćaju li iste točan rezultat</a:t>
             </a:r>
             <a:endParaRPr lang="en-US" sz="2400" dirty="0"/>
           </a:p>
@@ -4981,7 +4968,7 @@
         </p:blipFill>
         <p:spPr>
           <a:xfrm>
-            <a:off x="953208" y="1291905"/>
+            <a:off x="953208" y="1325035"/>
             <a:ext cx="7478951" cy="1812023"/>
           </a:xfrm>
           <a:prstGeom prst="rect">
@@ -5226,7 +5213,7 @@
               </a:lnSpc>
             </a:pPr>
             <a:r>
-              <a:rPr lang="hr-HR" sz="2000" dirty="0" err="1"/>
+              <a:rPr lang="hr-HR" sz="2000" i="1" dirty="0" err="1"/>
               <a:t>Frontend</a:t>
             </a:r>
             <a:r>
@@ -5241,7 +5228,7 @@
               </a:lnSpc>
             </a:pPr>
             <a:r>
-              <a:rPr lang="hr-HR" sz="2000" dirty="0" err="1"/>
+              <a:rPr lang="hr-HR" sz="2000" i="1" dirty="0" err="1"/>
               <a:t>Backend</a:t>
             </a:r>
             <a:r>
@@ -5307,11 +5294,11 @@
             </a:r>
             <a:r>
               <a:rPr lang="hr-HR" sz="2400" dirty="0"/>
-              <a:t> studio </a:t>
+              <a:t> Studio </a:t>
             </a:r>
             <a:r>
               <a:rPr lang="hr-HR" sz="2400" dirty="0" err="1"/>
-              <a:t>code</a:t>
+              <a:t>Code</a:t>
             </a:r>
             <a:r>
               <a:rPr lang="hr-HR" sz="2400" dirty="0"/>
@@ -5489,7 +5476,7 @@
             </a:pPr>
             <a:r>
               <a:rPr lang="hr-HR" sz="2400" dirty="0"/>
-              <a:t>Razvoj se odvijao u 4 mini ciklusa</a:t>
+              <a:t>Razvoj se odvijao u 4 „mini” ciklusa</a:t>
             </a:r>
           </a:p>
           <a:p>
@@ -5545,7 +5532,7 @@
             </a:pPr>
             <a:r>
               <a:rPr lang="hr-HR" sz="2400" dirty="0"/>
-              <a:t>Najsličnije cikličnom modelu</a:t>
+              <a:t>Najsličnija cikličkom modelu</a:t>
             </a:r>
           </a:p>
           <a:p>
@@ -5556,7 +5543,7 @@
             </a:pPr>
             <a:r>
               <a:rPr lang="hr-HR" sz="2400" dirty="0"/>
-              <a:t>Svaki član je prosječno radio 24-34 sati na projektu</a:t>
+              <a:t>Svaki član prosječno je na projektu radio 24-34 sati</a:t>
             </a:r>
           </a:p>
         </p:txBody>
@@ -5631,283 +5618,6 @@
           <a:p>
             <a:r>
               <a:rPr lang="hr-HR" dirty="0"/>
-              <a:t>Organizacija rada</a:t>
-            </a:r>
-          </a:p>
-        </p:txBody>
-      </p:sp>
-      <p:sp>
-        <p:nvSpPr>
-          <p:cNvPr id="3" name="Content Placeholder 2"/>
-          <p:cNvSpPr>
-            <a:spLocks noGrp="1"/>
-          </p:cNvSpPr>
-          <p:nvPr>
-            <p:ph idx="1"/>
-          </p:nvPr>
-        </p:nvSpPr>
-        <p:spPr/>
-        <p:txBody>
-          <a:bodyPr>
-            <a:normAutofit/>
-          </a:bodyPr>
-          <a:lstStyle/>
-          <a:p>
-            <a:pPr>
-              <a:lnSpc>
-                <a:spcPct val="100000"/>
-              </a:lnSpc>
-            </a:pPr>
-            <a:r>
-              <a:rPr lang="hr-HR" sz="2400" dirty="0"/>
-              <a:t>Vremenska linija razvoja (specifikacija, implementacija, ispitivanje, dokumentiranje)</a:t>
-            </a:r>
-          </a:p>
-          <a:p>
-            <a:pPr lvl="1">
-              <a:lnSpc>
-                <a:spcPct val="100000"/>
-              </a:lnSpc>
-            </a:pPr>
-            <a:r>
-              <a:rPr lang="hr-HR" sz="2000" dirty="0"/>
-              <a:t>Poželjan grafički prikaz</a:t>
-            </a:r>
-            <a:endParaRPr lang="en-US" sz="2000" dirty="0"/>
-          </a:p>
-          <a:p>
-            <a:pPr lvl="1">
-              <a:lnSpc>
-                <a:spcPct val="100000"/>
-              </a:lnSpc>
-            </a:pPr>
-            <a:r>
-              <a:rPr lang="en-US" sz="2000" dirty="0" err="1"/>
-              <a:t>Prokomentirati</a:t>
-            </a:r>
-            <a:r>
-              <a:rPr lang="en-US" sz="2000" dirty="0"/>
-              <a:t> </a:t>
-            </a:r>
-            <a:r>
-              <a:rPr lang="en-US" sz="2000" dirty="0" err="1"/>
-              <a:t>kojem</a:t>
-            </a:r>
-            <a:r>
-              <a:rPr lang="en-US" sz="2000" dirty="0"/>
-              <a:t> je SDLC </a:t>
-            </a:r>
-            <a:r>
-              <a:rPr lang="en-US" sz="2000" dirty="0" err="1"/>
-              <a:t>modelu</a:t>
-            </a:r>
-            <a:r>
-              <a:rPr lang="en-US" sz="2000" dirty="0"/>
-              <a:t> </a:t>
-            </a:r>
-            <a:r>
-              <a:rPr lang="en-US" sz="2000" dirty="0" err="1"/>
-              <a:t>Vaš</a:t>
-            </a:r>
-            <a:r>
-              <a:rPr lang="en-US" sz="2000" dirty="0"/>
-              <a:t> </a:t>
-            </a:r>
-            <a:r>
-              <a:rPr lang="en-US" sz="2000" dirty="0" err="1"/>
-              <a:t>proces</a:t>
-            </a:r>
-            <a:r>
-              <a:rPr lang="en-US" sz="2000" dirty="0"/>
-              <a:t> </a:t>
-            </a:r>
-            <a:r>
-              <a:rPr lang="en-US" sz="2000" dirty="0" err="1"/>
-              <a:t>razvoja</a:t>
-            </a:r>
-            <a:r>
-              <a:rPr lang="en-US" sz="2000" dirty="0"/>
-              <a:t> bio </a:t>
-            </a:r>
-            <a:r>
-              <a:rPr lang="en-US" sz="2000" dirty="0" err="1"/>
-              <a:t>najsličniji</a:t>
-            </a:r>
-            <a:r>
-              <a:rPr lang="en-US" sz="2000" dirty="0"/>
-              <a:t> (</a:t>
-            </a:r>
-            <a:r>
-              <a:rPr lang="en-US" sz="2000" dirty="0" err="1"/>
-              <a:t>vodopadni</a:t>
-            </a:r>
-            <a:r>
-              <a:rPr lang="en-US" sz="2000" dirty="0"/>
-              <a:t>, </a:t>
-            </a:r>
-            <a:r>
-              <a:rPr lang="en-US" sz="2000" dirty="0" err="1"/>
-              <a:t>agilni</a:t>
-            </a:r>
-            <a:r>
-              <a:rPr lang="en-US" sz="2000" dirty="0"/>
-              <a:t>…)</a:t>
-            </a:r>
-            <a:endParaRPr lang="hr-HR" sz="2000" dirty="0"/>
-          </a:p>
-          <a:p>
-            <a:pPr marL="457200" lvl="1" indent="0">
-              <a:lnSpc>
-                <a:spcPct val="100000"/>
-              </a:lnSpc>
-              <a:buNone/>
-            </a:pPr>
-            <a:endParaRPr lang="hr-HR" sz="2000" dirty="0"/>
-          </a:p>
-          <a:p>
-            <a:pPr>
-              <a:lnSpc>
-                <a:spcPct val="100000"/>
-              </a:lnSpc>
-            </a:pPr>
-            <a:r>
-              <a:rPr lang="hr-HR" sz="2400" dirty="0"/>
-              <a:t>Raspodjela posla po članovima tima</a:t>
-            </a:r>
-            <a:endParaRPr lang="en-US" sz="2400" dirty="0"/>
-          </a:p>
-          <a:p>
-            <a:pPr lvl="1">
-              <a:lnSpc>
-                <a:spcPct val="100000"/>
-              </a:lnSpc>
-            </a:pPr>
-            <a:r>
-              <a:rPr lang="en-US" sz="1800" dirty="0" err="1"/>
-              <a:t>Navesti</a:t>
-            </a:r>
-            <a:r>
-              <a:rPr lang="en-US" sz="1800" dirty="0"/>
-              <a:t> </a:t>
-            </a:r>
-            <a:r>
-              <a:rPr lang="en-US" sz="1800" dirty="0" err="1"/>
-              <a:t>približan</a:t>
-            </a:r>
-            <a:r>
-              <a:rPr lang="en-US" sz="1800" dirty="0"/>
-              <a:t> </a:t>
-            </a:r>
-            <a:r>
-              <a:rPr lang="en-US" sz="1800" dirty="0" err="1"/>
-              <a:t>broj</a:t>
-            </a:r>
-            <a:r>
-              <a:rPr lang="en-US" sz="1800" dirty="0"/>
-              <a:t> sati </a:t>
-            </a:r>
-            <a:r>
-              <a:rPr lang="en-US" sz="1800" dirty="0" err="1"/>
-              <a:t>utrošenih</a:t>
-            </a:r>
-            <a:r>
-              <a:rPr lang="en-US" sz="1800" dirty="0"/>
-              <a:t> </a:t>
-            </a:r>
-            <a:r>
-              <a:rPr lang="en-US" sz="1800" dirty="0" err="1"/>
-              <a:t>na</a:t>
-            </a:r>
-            <a:r>
-              <a:rPr lang="en-US" sz="1800" dirty="0"/>
-              <a:t> </a:t>
-            </a:r>
-            <a:r>
-              <a:rPr lang="en-US" sz="1800" dirty="0" err="1"/>
-              <a:t>izradu</a:t>
-            </a:r>
-            <a:r>
-              <a:rPr lang="en-US" sz="1800" dirty="0"/>
-              <a:t> </a:t>
-            </a:r>
-            <a:r>
-              <a:rPr lang="en-US" sz="1800" dirty="0" err="1"/>
-              <a:t>projekta</a:t>
-            </a:r>
-            <a:endParaRPr lang="hr-HR" sz="1800" dirty="0"/>
-          </a:p>
-        </p:txBody>
-      </p:sp>
-      <p:sp>
-        <p:nvSpPr>
-          <p:cNvPr id="4" name="Slide Number Placeholder 3"/>
-          <p:cNvSpPr>
-            <a:spLocks noGrp="1"/>
-          </p:cNvSpPr>
-          <p:nvPr>
-            <p:ph type="sldNum" sz="quarter" idx="12"/>
-          </p:nvPr>
-        </p:nvSpPr>
-        <p:spPr/>
-        <p:txBody>
-          <a:bodyPr/>
-          <a:lstStyle/>
-          <a:p>
-            <a:fld id="{FAA41844-C0CA-4144-9D6C-D993F0C0FAB4}" type="slidenum">
-              <a:rPr lang="hr-HR" smtClean="0"/>
-              <a:t>15</a:t>
-            </a:fld>
-            <a:endParaRPr lang="hr-HR"/>
-          </a:p>
-        </p:txBody>
-      </p:sp>
-    </p:spTree>
-    <p:extLst>
-      <p:ext uri="{BB962C8B-B14F-4D97-AF65-F5344CB8AC3E}">
-        <p14:creationId xmlns:p14="http://schemas.microsoft.com/office/powerpoint/2010/main" val="460487262"/>
-      </p:ext>
-    </p:extLst>
-  </p:cSld>
-  <p:clrMapOvr>
-    <a:masterClrMapping/>
-  </p:clrMapOvr>
-</p:sld>
-</file>
-
-<file path=ppt/slides/slide16.xml><?xml version="1.0" encoding="utf-8"?>
-<p:sld xmlns:a="http://schemas.openxmlformats.org/drawingml/2006/main" xmlns:r="http://schemas.openxmlformats.org/officeDocument/2006/relationships" xmlns:p="http://schemas.openxmlformats.org/presentationml/2006/main">
-  <p:cSld>
-    <p:spTree>
-      <p:nvGrpSpPr>
-        <p:cNvPr id="1" name=""/>
-        <p:cNvGrpSpPr/>
-        <p:nvPr/>
-      </p:nvGrpSpPr>
-      <p:grpSpPr>
-        <a:xfrm>
-          <a:off x="0" y="0"/>
-          <a:ext cx="0" cy="0"/>
-          <a:chOff x="0" y="0"/>
-          <a:chExt cx="0" cy="0"/>
-        </a:xfrm>
-      </p:grpSpPr>
-      <p:sp>
-        <p:nvSpPr>
-          <p:cNvPr id="2" name="Title 1"/>
-          <p:cNvSpPr>
-            <a:spLocks noGrp="1"/>
-          </p:cNvSpPr>
-          <p:nvPr>
-            <p:ph type="title"/>
-          </p:nvPr>
-        </p:nvSpPr>
-        <p:spPr/>
-        <p:txBody>
-          <a:bodyPr/>
-          <a:lstStyle/>
-          <a:p>
-            <a:r>
-              <a:rPr lang="hr-HR" dirty="0"/>
               <a:t>Naučene lekcije</a:t>
             </a:r>
           </a:p>
@@ -5965,7 +5675,7 @@
               <a:rPr lang="hr-HR" dirty="0">
                 <a:sym typeface="Wingdings" panose="05000000000000000000" pitchFamily="2" charset="2"/>
               </a:rPr>
-              <a:t>Moglo bolje:</a:t>
+              <a:t>Moglo je bolje:</a:t>
             </a:r>
           </a:p>
           <a:p>
@@ -5998,7 +5708,13 @@
               <a:rPr lang="hr-HR" dirty="0">
                 <a:sym typeface="Wingdings" panose="05000000000000000000" pitchFamily="2" charset="2"/>
               </a:rPr>
-              <a:t> umjesto Express-a</a:t>
+              <a:t> umjesto </a:t>
+            </a:r>
+            <a:r>
+              <a:rPr lang="hr-HR" i="1" dirty="0">
+                <a:sym typeface="Wingdings" panose="05000000000000000000" pitchFamily="2" charset="2"/>
+              </a:rPr>
+              <a:t>Express-a</a:t>
             </a:r>
           </a:p>
           <a:p>
@@ -6015,31 +5731,37 @@
               <a:rPr lang="hr-HR" dirty="0">
                 <a:sym typeface="Wingdings" panose="05000000000000000000" pitchFamily="2" charset="2"/>
               </a:rPr>
-              <a:t>Nikad više ne pisati </a:t>
+              <a:t>Nikad više razvoj </a:t>
+            </a:r>
+            <a:r>
+              <a:rPr lang="hr-HR" i="1" dirty="0" err="1">
+                <a:sym typeface="Wingdings" panose="05000000000000000000" pitchFamily="2" charset="2"/>
+              </a:rPr>
+              <a:t>backend</a:t>
+            </a:r>
+            <a:r>
+              <a:rPr lang="hr-HR" i="1" dirty="0">
+                <a:sym typeface="Wingdings" panose="05000000000000000000" pitchFamily="2" charset="2"/>
+              </a:rPr>
+              <a:t> </a:t>
+            </a:r>
+            <a:r>
+              <a:rPr lang="hr-HR" dirty="0">
+                <a:sym typeface="Wingdings" panose="05000000000000000000" pitchFamily="2" charset="2"/>
+              </a:rPr>
+              <a:t>tehnologije bez </a:t>
             </a:r>
             <a:r>
               <a:rPr lang="hr-HR" dirty="0" err="1">
                 <a:sym typeface="Wingdings" panose="05000000000000000000" pitchFamily="2" charset="2"/>
               </a:rPr>
-              <a:t>backend</a:t>
+              <a:t>TypeScript</a:t>
             </a:r>
             <a:r>
               <a:rPr lang="hr-HR" dirty="0">
                 <a:sym typeface="Wingdings" panose="05000000000000000000" pitchFamily="2" charset="2"/>
               </a:rPr>
-              <a:t>-e bez </a:t>
-            </a:r>
-            <a:r>
-              <a:rPr lang="hr-HR" dirty="0" err="1">
-                <a:sym typeface="Wingdings" panose="05000000000000000000" pitchFamily="2" charset="2"/>
-              </a:rPr>
-              <a:t>TypeScripta</a:t>
-            </a:r>
-            <a:r>
-              <a:rPr lang="hr-HR" dirty="0">
-                <a:sym typeface="Wingdings" panose="05000000000000000000" pitchFamily="2" charset="2"/>
-              </a:rPr>
-              <a:t>, sigurno 50% manje vremena utrošeno u </a:t>
+              <a:t>-a, sigurno bi barem 50% manje vremena bilo utrošeno u </a:t>
             </a:r>
             <a:r>
               <a:rPr lang="hr-HR" dirty="0" err="1">
@@ -6079,7 +5801,7 @@
           <a:p>
             <a:fld id="{FAA41844-C0CA-4144-9D6C-D993F0C0FAB4}" type="slidenum">
               <a:rPr lang="hr-HR" smtClean="0"/>
-              <a:t>16</a:t>
+              <a:t>15</a:t>
             </a:fld>
             <a:endParaRPr lang="hr-HR"/>
           </a:p>
@@ -6309,13 +6031,13 @@
           <a:p>
             <a:r>
               <a:rPr lang="hr-HR" sz="2400" dirty="0"/>
-              <a:t>Nino Nogić – Voditelj grupe, upravljanje projektom / </a:t>
-            </a:r>
-            <a:r>
-              <a:rPr lang="hr-HR" sz="2400" dirty="0" err="1"/>
+              <a:t>Nino Nogić – voditelj grupe, upravljanje projektom / </a:t>
+            </a:r>
+            <a:r>
+              <a:rPr lang="hr-HR" sz="2400" i="1" dirty="0" err="1"/>
               <a:t>backend</a:t>
             </a:r>
-            <a:endParaRPr lang="hr-HR" sz="2400" dirty="0"/>
+            <a:endParaRPr lang="hr-HR" sz="2400" i="1" dirty="0"/>
           </a:p>
           <a:p>
             <a:r>
@@ -6331,10 +6053,10 @@
               <a:t> – dokumentacija / </a:t>
             </a:r>
             <a:r>
-              <a:rPr lang="hr-HR" sz="2400" dirty="0" err="1"/>
+              <a:rPr lang="hr-HR" sz="2400" i="1" dirty="0" err="1"/>
               <a:t>backend</a:t>
             </a:r>
-            <a:endParaRPr lang="hr-HR" sz="2400" dirty="0"/>
+            <a:endParaRPr lang="hr-HR" sz="2400" i="1" dirty="0"/>
           </a:p>
           <a:p>
             <a:r>
@@ -6342,10 +6064,10 @@
               <a:t>Borna Krušlin - dokumentacija / </a:t>
             </a:r>
             <a:r>
-              <a:rPr lang="hr-HR" sz="2400" dirty="0" err="1"/>
+              <a:rPr lang="hr-HR" sz="2400" i="1" dirty="0" err="1"/>
               <a:t>backend</a:t>
             </a:r>
-            <a:endParaRPr lang="hr-HR" sz="2400" dirty="0"/>
+            <a:endParaRPr lang="hr-HR" sz="2400" i="1" dirty="0"/>
           </a:p>
           <a:p>
             <a:r>
@@ -6375,10 +6097,10 @@
               <a:t> – dokumentacija / </a:t>
             </a:r>
             <a:r>
-              <a:rPr lang="hr-HR" sz="2400" dirty="0" err="1"/>
+              <a:rPr lang="hr-HR" sz="2400" i="1" dirty="0" err="1"/>
               <a:t>frontend</a:t>
             </a:r>
-            <a:endParaRPr lang="hr-HR" sz="2400" dirty="0"/>
+            <a:endParaRPr lang="hr-HR" sz="2400" i="1" dirty="0"/>
           </a:p>
           <a:p>
             <a:r>
@@ -6386,7 +6108,7 @@
               <a:t>Alberto Kerim – dokumentacija / </a:t>
             </a:r>
             <a:r>
-              <a:rPr lang="hr-HR" sz="2400" dirty="0" err="1"/>
+              <a:rPr lang="hr-HR" sz="2400" i="1" dirty="0" err="1"/>
               <a:t>frontend</a:t>
             </a:r>
             <a:r>
@@ -6394,23 +6116,15 @@
               <a:t> / </a:t>
             </a:r>
             <a:r>
-              <a:rPr lang="hr-HR" sz="2400" dirty="0" err="1"/>
+              <a:rPr lang="hr-HR" sz="2400" i="1" dirty="0" err="1"/>
               <a:t>backend</a:t>
             </a:r>
-            <a:endParaRPr lang="hr-HR" sz="2400" dirty="0"/>
+            <a:endParaRPr lang="hr-HR" sz="2400" i="1" dirty="0"/>
           </a:p>
           <a:p>
             <a:r>
               <a:rPr lang="hr-HR" sz="2400" dirty="0"/>
-              <a:t>Lana </a:t>
-            </a:r>
-            <a:r>
-              <a:rPr lang="hr-HR" sz="2400" dirty="0" err="1"/>
-              <a:t>Kuretić</a:t>
-            </a:r>
-            <a:r>
-              <a:rPr lang="hr-HR" sz="2400" dirty="0"/>
-              <a:t> – dokumentacija / UX / UI / lektoriranje</a:t>
+              <a:t>Lana Kuretić – dokumentacija / UX &amp; UI / lektura</a:t>
             </a:r>
           </a:p>
         </p:txBody>
@@ -6684,7 +6398,7 @@
             </a:pPr>
             <a:r>
               <a:rPr lang="hr-HR" sz="2400" dirty="0"/>
-              <a:t>Na tržištu postoji nekoliko sličnih aplikacija </a:t>
+              <a:t>Na tržištu postoji nekoliko sličnih aplikacija:</a:t>
             </a:r>
           </a:p>
           <a:p>
@@ -7079,32 +6793,6 @@
       </p:sp>
       <p:sp>
         <p:nvSpPr>
-          <p:cNvPr id="3" name="Content Placeholder 2"/>
-          <p:cNvSpPr>
-            <a:spLocks noGrp="1"/>
-          </p:cNvSpPr>
-          <p:nvPr>
-            <p:ph idx="1"/>
-          </p:nvPr>
-        </p:nvSpPr>
-        <p:spPr/>
-        <p:txBody>
-          <a:bodyPr>
-            <a:normAutofit/>
-          </a:bodyPr>
-          <a:lstStyle/>
-          <a:p>
-            <a:pPr>
-              <a:lnSpc>
-                <a:spcPct val="100000"/>
-              </a:lnSpc>
-            </a:pPr>
-            <a:endParaRPr lang="hr-HR" sz="1800" dirty="0"/>
-          </a:p>
-        </p:txBody>
-      </p:sp>
-      <p:sp>
-        <p:nvSpPr>
           <p:cNvPr id="4" name="Slide Number Placeholder 3"/>
           <p:cNvSpPr>
             <a:spLocks noGrp="1"/>
@@ -7279,8 +6967,8 @@
         </p:blipFill>
         <p:spPr>
           <a:xfrm>
-            <a:off x="0" y="1395554"/>
-            <a:ext cx="9144000" cy="3739317"/>
+            <a:off x="137303" y="1521450"/>
+            <a:ext cx="8869393" cy="3627020"/>
           </a:xfrm>
           <a:prstGeom prst="rect">
             <a:avLst/>
@@ -7410,7 +7098,7 @@
         </p:blipFill>
         <p:spPr>
           <a:xfrm>
-            <a:off x="628650" y="1209965"/>
+            <a:off x="628650" y="1346140"/>
             <a:ext cx="7886700" cy="4917662"/>
           </a:xfrm>
           <a:prstGeom prst="rect">

</xml_diff>